<commit_message>
Documented new API features.
Signed-off-by: Ralph Lange (CR/AEE1) <ralph.lange@de.bosch.com>
</commit_message>
<xml_diff>
--- a/fmi_adapter/doc/high-level_architecture.pptx
+++ b/fmi_adapter/doc/high-level_architecture.pptx
@@ -254,7 +254,7 @@
           <a:p>
             <a:fld id="{AA7A5F03-C626-438F-B120-FF6808F5F05F}" type="datetimeFigureOut">
               <a:rPr lang="en-US" smtClean="0"/>
-              <a:t>7/13/2018</a:t>
+              <a:t>9/27/2018</a:t>
             </a:fld>
             <a:endParaRPr lang="en-US"/>
           </a:p>
@@ -424,7 +424,7 @@
           <a:p>
             <a:fld id="{AA7A5F03-C626-438F-B120-FF6808F5F05F}" type="datetimeFigureOut">
               <a:rPr lang="en-US" smtClean="0"/>
-              <a:t>7/13/2018</a:t>
+              <a:t>9/27/2018</a:t>
             </a:fld>
             <a:endParaRPr lang="en-US"/>
           </a:p>
@@ -604,7 +604,7 @@
           <a:p>
             <a:fld id="{AA7A5F03-C626-438F-B120-FF6808F5F05F}" type="datetimeFigureOut">
               <a:rPr lang="en-US" smtClean="0"/>
-              <a:t>7/13/2018</a:t>
+              <a:t>9/27/2018</a:t>
             </a:fld>
             <a:endParaRPr lang="en-US"/>
           </a:p>
@@ -774,7 +774,7 @@
           <a:p>
             <a:fld id="{AA7A5F03-C626-438F-B120-FF6808F5F05F}" type="datetimeFigureOut">
               <a:rPr lang="en-US" smtClean="0"/>
-              <a:t>7/13/2018</a:t>
+              <a:t>9/27/2018</a:t>
             </a:fld>
             <a:endParaRPr lang="en-US"/>
           </a:p>
@@ -1020,7 +1020,7 @@
           <a:p>
             <a:fld id="{AA7A5F03-C626-438F-B120-FF6808F5F05F}" type="datetimeFigureOut">
               <a:rPr lang="en-US" smtClean="0"/>
-              <a:t>7/13/2018</a:t>
+              <a:t>9/27/2018</a:t>
             </a:fld>
             <a:endParaRPr lang="en-US"/>
           </a:p>
@@ -1252,7 +1252,7 @@
           <a:p>
             <a:fld id="{AA7A5F03-C626-438F-B120-FF6808F5F05F}" type="datetimeFigureOut">
               <a:rPr lang="en-US" smtClean="0"/>
-              <a:t>7/13/2018</a:t>
+              <a:t>9/27/2018</a:t>
             </a:fld>
             <a:endParaRPr lang="en-US"/>
           </a:p>
@@ -1619,7 +1619,7 @@
           <a:p>
             <a:fld id="{AA7A5F03-C626-438F-B120-FF6808F5F05F}" type="datetimeFigureOut">
               <a:rPr lang="en-US" smtClean="0"/>
-              <a:t>7/13/2018</a:t>
+              <a:t>9/27/2018</a:t>
             </a:fld>
             <a:endParaRPr lang="en-US"/>
           </a:p>
@@ -1737,7 +1737,7 @@
           <a:p>
             <a:fld id="{AA7A5F03-C626-438F-B120-FF6808F5F05F}" type="datetimeFigureOut">
               <a:rPr lang="en-US" smtClean="0"/>
-              <a:t>7/13/2018</a:t>
+              <a:t>9/27/2018</a:t>
             </a:fld>
             <a:endParaRPr lang="en-US"/>
           </a:p>
@@ -1832,7 +1832,7 @@
           <a:p>
             <a:fld id="{AA7A5F03-C626-438F-B120-FF6808F5F05F}" type="datetimeFigureOut">
               <a:rPr lang="en-US" smtClean="0"/>
-              <a:t>7/13/2018</a:t>
+              <a:t>9/27/2018</a:t>
             </a:fld>
             <a:endParaRPr lang="en-US"/>
           </a:p>
@@ -2109,7 +2109,7 @@
           <a:p>
             <a:fld id="{AA7A5F03-C626-438F-B120-FF6808F5F05F}" type="datetimeFigureOut">
               <a:rPr lang="en-US" smtClean="0"/>
-              <a:t>7/13/2018</a:t>
+              <a:t>9/27/2018</a:t>
             </a:fld>
             <a:endParaRPr lang="en-US"/>
           </a:p>
@@ -2362,7 +2362,7 @@
           <a:p>
             <a:fld id="{AA7A5F03-C626-438F-B120-FF6808F5F05F}" type="datetimeFigureOut">
               <a:rPr lang="en-US" smtClean="0"/>
-              <a:t>7/13/2018</a:t>
+              <a:t>9/27/2018</a:t>
             </a:fld>
             <a:endParaRPr lang="en-US"/>
           </a:p>
@@ -2575,7 +2575,7 @@
           <a:p>
             <a:fld id="{AA7A5F03-C626-438F-B120-FF6808F5F05F}" type="datetimeFigureOut">
               <a:rPr lang="en-US" smtClean="0"/>
-              <a:t>7/13/2018</a:t>
+              <a:t>9/27/2018</a:t>
             </a:fld>
             <a:endParaRPr lang="en-US"/>
           </a:p>
@@ -4859,7 +4859,7 @@
           <a:p>
             <a:r>
               <a:rPr lang="en-US" sz="900" dirty="0" err="1" smtClean="0"/>
-              <a:t>calcUntil</a:t>
+              <a:t>doStepsUntil</a:t>
             </a:r>
             <a:endParaRPr lang="en-US" sz="900" dirty="0"/>
           </a:p>
@@ -7230,7 +7230,7 @@
           <a:p>
             <a:r>
               <a:rPr lang="en-US" sz="900" dirty="0" err="1" smtClean="0"/>
-              <a:t>calcUntil</a:t>
+              <a:t>doStepsUntil</a:t>
             </a:r>
             <a:endParaRPr lang="en-US" sz="900" dirty="0"/>
           </a:p>

</xml_diff>